<commit_message>
updated the presentation with EDA Insights
</commit_message>
<xml_diff>
--- a/Lending_Club_Case_study.pptx
+++ b/Lending_Club_Case_study.pptx
@@ -17,9 +17,10 @@
     <p:sldId id="275" r:id="rId11"/>
     <p:sldId id="276" r:id="rId12"/>
     <p:sldId id="281" r:id="rId13"/>
-    <p:sldId id="277" r:id="rId14"/>
-    <p:sldId id="263" r:id="rId15"/>
-    <p:sldId id="271" r:id="rId16"/>
+    <p:sldId id="282" r:id="rId14"/>
+    <p:sldId id="283" r:id="rId15"/>
+    <p:sldId id="263" r:id="rId16"/>
+    <p:sldId id="271" r:id="rId17"/>
   </p:sldIdLst>
   <p:sldSz cx="12192000" cy="6858000"/>
   <p:notesSz cx="6858000" cy="9144000"/>
@@ -3942,7 +3943,7 @@
           <a:p>
             <a:r>
               <a:rPr lang="en-US" dirty="0"/>
-              <a:t>Borrowers with longer job tenures who take out larger loans generally have higher default rates.</a:t>
+              <a:t>Borrowers with more job years and larger loan amounts typically experience higher default rates</a:t>
             </a:r>
           </a:p>
         </p:txBody>
@@ -4039,7 +4040,7 @@
               <a:rPr lang="en-US" sz="2000" b="1" dirty="0">
                 <a:latin typeface="+mn-lt"/>
               </a:rPr>
-              <a:t>Analysis-Purpose vs Loan Status</a:t>
+              <a:t>Analysis Of Employment Years Vs Interest Rate</a:t>
             </a:r>
           </a:p>
         </p:txBody>
@@ -4095,7 +4096,7 @@
         <p:spPr>
           <a:xfrm>
             <a:off x="482833" y="5342817"/>
-            <a:ext cx="11379200" cy="923330"/>
+            <a:ext cx="11379200" cy="369332"/>
           </a:xfrm>
           <a:prstGeom prst="rect">
             <a:avLst/>
@@ -4108,37 +4109,10 @@
           </a:bodyPr>
           <a:lstStyle/>
           <a:p>
-            <a:pPr marL="285750" indent="-285750">
-              <a:buFont typeface="Arial" panose="020B0604020202020204" pitchFamily="34" charset="0"/>
-              <a:buChar char="•"/>
-            </a:pPr>
-            <a:r>
-              <a:rPr lang="en-US" b="0" i="0" dirty="0">
-                <a:effectLst/>
-              </a:rPr>
-              <a:t>There is around 20% chance of loan default in each home ownership category.</a:t>
-            </a:r>
-          </a:p>
-          <a:p>
-            <a:pPr marL="285750" indent="-285750">
-              <a:buFont typeface="Arial" panose="020B0604020202020204" pitchFamily="34" charset="0"/>
-              <a:buChar char="•"/>
-            </a:pPr>
-            <a:r>
-              <a:rPr lang="en-US" b="0" i="0" dirty="0">
-                <a:effectLst/>
-              </a:rPr>
-              <a:t>From the 2nd plot we can see the people with higher loan amounts in mortgage home ownership has</a:t>
-            </a:r>
-          </a:p>
-          <a:p>
-            <a:r>
-              <a:rPr lang="en-US" b="0" i="0" dirty="0">
-                <a:effectLst/>
-              </a:rPr>
-              <a:t>     high default rate than others</a:t>
-            </a:r>
-            <a:endParaRPr lang="en-US" dirty="0"/>
+            <a:r>
+              <a:rPr lang="en-US" dirty="0"/>
+              <a:t>Regardless of employment length, loans with higher interest rates tend to have higher default rates.</a:t>
+            </a:r>
           </a:p>
         </p:txBody>
       </p:sp>
@@ -4147,7 +4121,7 @@
           <p:cNvPr id="5" name="Picture 4">
             <a:extLst>
               <a:ext uri="{FF2B5EF4-FFF2-40B4-BE49-F238E27FC236}">
-                <a16:creationId xmlns:a16="http://schemas.microsoft.com/office/drawing/2014/main" id="{D05918DE-1A53-CB8E-8060-60C5C755D39E}"/>
+                <a16:creationId xmlns:a16="http://schemas.microsoft.com/office/drawing/2014/main" id="{7BD939D6-F99C-3E84-8229-5EC92B75931D}"/>
               </a:ext>
             </a:extLst>
           </p:cNvPr>
@@ -4164,38 +4138,8 @@
         </p:blipFill>
         <p:spPr>
           <a:xfrm>
-            <a:off x="838200" y="1069759"/>
-            <a:ext cx="5236610" cy="3884337"/>
-          </a:xfrm>
-          <a:prstGeom prst="rect">
-            <a:avLst/>
-          </a:prstGeom>
-        </p:spPr>
-      </p:pic>
-      <p:pic>
-        <p:nvPicPr>
-          <p:cNvPr id="9" name="Picture 8">
-            <a:extLst>
-              <a:ext uri="{FF2B5EF4-FFF2-40B4-BE49-F238E27FC236}">
-                <a16:creationId xmlns:a16="http://schemas.microsoft.com/office/drawing/2014/main" id="{7C30F71D-D157-9CD5-E1BB-481667168884}"/>
-              </a:ext>
-            </a:extLst>
-          </p:cNvPr>
-          <p:cNvPicPr>
-            <a:picLocks noChangeAspect="1"/>
-          </p:cNvPicPr>
-          <p:nvPr/>
-        </p:nvPicPr>
-        <p:blipFill>
-          <a:blip r:embed="rId3"/>
-          <a:stretch>
-            <a:fillRect/>
-          </a:stretch>
-        </p:blipFill>
-        <p:spPr>
-          <a:xfrm>
-            <a:off x="5242114" y="1069759"/>
-            <a:ext cx="5667375" cy="3884337"/>
+            <a:off x="119062" y="1443037"/>
+            <a:ext cx="11953875" cy="3971925"/>
           </a:xfrm>
           <a:prstGeom prst="rect">
             <a:avLst/>
@@ -4205,7 +4149,7 @@
     </p:spTree>
     <p:extLst>
       <p:ext uri="{BB962C8B-B14F-4D97-AF65-F5344CB8AC3E}">
-        <p14:creationId xmlns:p14="http://schemas.microsoft.com/office/powerpoint/2010/main" val="175261434"/>
+        <p14:creationId xmlns:p14="http://schemas.microsoft.com/office/powerpoint/2010/main" val="2891399871"/>
       </p:ext>
     </p:extLst>
   </p:cSld>
@@ -4237,7 +4181,7 @@
           <p:cNvPr id="2" name="Title 1">
             <a:extLst>
               <a:ext uri="{FF2B5EF4-FFF2-40B4-BE49-F238E27FC236}">
-                <a16:creationId xmlns:a16="http://schemas.microsoft.com/office/drawing/2014/main" id="{FBAF1ACA-C322-D44E-F598-C73F1596AE95}"/>
+                <a16:creationId xmlns:a16="http://schemas.microsoft.com/office/drawing/2014/main" id="{2DB8854D-7598-190D-BBB5-33A192C9D889}"/>
               </a:ext>
             </a:extLst>
           </p:cNvPr>
@@ -4250,45 +4194,8 @@
         </p:nvSpPr>
         <p:spPr>
           <a:xfrm>
-            <a:off x="838200" y="-203052"/>
-            <a:ext cx="10515600" cy="1325563"/>
-          </a:xfrm>
-        </p:spPr>
-        <p:txBody>
-          <a:bodyPr>
-            <a:normAutofit/>
-          </a:bodyPr>
-          <a:lstStyle/>
-          <a:p>
-            <a:r>
-              <a:rPr lang="en-US" sz="2800" b="1" dirty="0">
-                <a:latin typeface="+mn-lt"/>
-              </a:rPr>
-              <a:t>Insights from EDA</a:t>
-            </a:r>
-          </a:p>
-        </p:txBody>
-      </p:sp>
-      <p:sp>
-        <p:nvSpPr>
-          <p:cNvPr id="3" name="Content Placeholder 2">
-            <a:extLst>
-              <a:ext uri="{FF2B5EF4-FFF2-40B4-BE49-F238E27FC236}">
-                <a16:creationId xmlns:a16="http://schemas.microsoft.com/office/drawing/2014/main" id="{3EFD0632-3C11-A6EA-0D98-398D85822143}"/>
-              </a:ext>
-            </a:extLst>
-          </p:cNvPr>
-          <p:cNvSpPr>
-            <a:spLocks noGrp="1"/>
-          </p:cNvSpPr>
-          <p:nvPr>
-            <p:ph idx="1"/>
-          </p:nvPr>
-        </p:nvSpPr>
-        <p:spPr>
-          <a:xfrm>
-            <a:off x="838200" y="857953"/>
-            <a:ext cx="10515600" cy="5667133"/>
+            <a:off x="838200" y="365126"/>
+            <a:ext cx="10515600" cy="315912"/>
           </a:xfrm>
         </p:spPr>
         <p:txBody>
@@ -4298,127 +4205,119 @@
           <a:lstStyle/>
           <a:p>
             <a:r>
-              <a:rPr lang="en-US" sz="1400" b="1" dirty="0"/>
-              <a:t>Key Insights:</a:t>
-            </a:r>
-          </a:p>
-          <a:p>
-            <a:pPr marL="0" indent="0">
-              <a:buNone/>
-            </a:pPr>
-            <a:r>
-              <a:rPr lang="en-US" sz="1400" dirty="0"/>
-              <a:t>Interest Rates and Defaults:</a:t>
-            </a:r>
-          </a:p>
-          <a:p>
-            <a:r>
-              <a:rPr lang="en-US" sz="1400" dirty="0"/>
-              <a:t>    Higher interest rates are strongly associated with higher default rates, irrespective of loan tenure and verification status.</a:t>
-            </a:r>
-          </a:p>
-          <a:p>
-            <a:r>
-              <a:rPr lang="en-US" sz="1400" dirty="0"/>
-              <a:t>    Borrowers with high revolving credit utilization face higher interest rates and tend to default more frequently.</a:t>
-            </a:r>
-          </a:p>
-          <a:p>
-            <a:pPr marL="0" indent="0">
-              <a:buNone/>
-            </a:pPr>
-            <a:r>
-              <a:rPr lang="en-US" sz="1400" dirty="0"/>
-              <a:t>Loan Amount and Defaults:</a:t>
-            </a:r>
-          </a:p>
-          <a:p>
-            <a:r>
-              <a:rPr lang="en-US" sz="1400" dirty="0"/>
-              <a:t>    Larger loan amounts, particularly in small business and home loan categories, are associated with higher default rates.</a:t>
-            </a:r>
-          </a:p>
-          <a:p>
-            <a:r>
-              <a:rPr lang="en-US" sz="1400" dirty="0"/>
-              <a:t>    High loan amounts in small business loans show a strong correlation with defaults.</a:t>
-            </a:r>
-          </a:p>
-          <a:p>
-            <a:pPr marL="0" indent="0">
-              <a:buNone/>
-            </a:pPr>
-            <a:r>
-              <a:rPr lang="en-US" sz="1400" dirty="0"/>
-              <a:t>Credit Grades and Defaults:</a:t>
-            </a:r>
-          </a:p>
-          <a:p>
-            <a:r>
-              <a:rPr lang="en-US" sz="1400" dirty="0"/>
-              <a:t>    Lower credit grades (F and G) are associated with higher default rates and larger loan amounts. Borrowers in these grades have higher public derogatory records.</a:t>
-            </a:r>
-          </a:p>
-          <a:p>
-            <a:r>
-              <a:rPr lang="en-US" sz="1400" dirty="0"/>
-              <a:t>    A-grade borrowers have fewer derogatory records and a lower default rate.</a:t>
-            </a:r>
-          </a:p>
-          <a:p>
-            <a:pPr marL="0" indent="0">
-              <a:buNone/>
-            </a:pPr>
-            <a:r>
-              <a:rPr lang="en-US" sz="1400" dirty="0"/>
-              <a:t>Home Ownership and DTI:</a:t>
-            </a:r>
-          </a:p>
-          <a:p>
-            <a:r>
-              <a:rPr lang="en-US" sz="1400" dirty="0"/>
-              <a:t>    Borrowers with mortgage ownership have higher incomes but also higher loan amounts, which correlates with higher default rates.</a:t>
-            </a:r>
-          </a:p>
-          <a:p>
-            <a:r>
-              <a:rPr lang="en-US" sz="1400" dirty="0"/>
-              <a:t>    "Other" home ownership categories have a lower DTI ratio, but an equal likelihood of default compared to other categories.</a:t>
-            </a:r>
-          </a:p>
-          <a:p>
-            <a:pPr marL="0" indent="0">
-              <a:buNone/>
-            </a:pPr>
-            <a:r>
-              <a:rPr lang="en-US" sz="1400" dirty="0"/>
-              <a:t>Public Records:</a:t>
-            </a:r>
-          </a:p>
-          <a:p>
-            <a:r>
-              <a:rPr lang="en-US" sz="1400" dirty="0"/>
-              <a:t>    Public derogatory records are highly correlated with public bankruptcy records, indicating that higher derogatory records are a strong predictor of default.</a:t>
-            </a:r>
-          </a:p>
-          <a:p>
-            <a:r>
-              <a:rPr lang="en-US" sz="1400" dirty="0"/>
-              <a:t>    Borrowers with 4 public derogatory records are predominantly in the mortgage ownership category and "Not Verified" status.</a:t>
-            </a:r>
-          </a:p>
-          <a:p>
-            <a:endParaRPr lang="en-US" sz="1400" dirty="0"/>
-          </a:p>
-          <a:p>
-            <a:endParaRPr lang="en-US" sz="1400" dirty="0"/>
-          </a:p>
-        </p:txBody>
-      </p:sp>
+              <a:rPr lang="en-US" sz="2000" b="1" dirty="0">
+                <a:latin typeface="+mn-lt"/>
+              </a:rPr>
+              <a:t>Analysis Of Home Ownership Vs Loan Status</a:t>
+            </a:r>
+          </a:p>
+        </p:txBody>
+      </p:sp>
+      <p:sp>
+        <p:nvSpPr>
+          <p:cNvPr id="3" name="Content Placeholder 2">
+            <a:extLst>
+              <a:ext uri="{FF2B5EF4-FFF2-40B4-BE49-F238E27FC236}">
+                <a16:creationId xmlns:a16="http://schemas.microsoft.com/office/drawing/2014/main" id="{5E214694-B4B5-874C-80F5-379A75305611}"/>
+              </a:ext>
+            </a:extLst>
+          </p:cNvPr>
+          <p:cNvSpPr>
+            <a:spLocks noGrp="1"/>
+          </p:cNvSpPr>
+          <p:nvPr>
+            <p:ph idx="1"/>
+          </p:nvPr>
+        </p:nvSpPr>
+        <p:spPr>
+          <a:xfrm>
+            <a:off x="740748" y="1188062"/>
+            <a:ext cx="10515600" cy="4351338"/>
+          </a:xfrm>
+        </p:spPr>
+        <p:txBody>
+          <a:bodyPr/>
+          <a:lstStyle/>
+          <a:p>
+            <a:endParaRPr lang="en-US" sz="2000" dirty="0"/>
+          </a:p>
+          <a:p>
+            <a:endParaRPr lang="en-US" sz="2000" dirty="0"/>
+          </a:p>
+          <a:p>
+            <a:endParaRPr lang="en-US" dirty="0"/>
+          </a:p>
+        </p:txBody>
+      </p:sp>
+      <p:sp>
+        <p:nvSpPr>
+          <p:cNvPr id="8" name="TextBox 7">
+            <a:extLst>
+              <a:ext uri="{FF2B5EF4-FFF2-40B4-BE49-F238E27FC236}">
+                <a16:creationId xmlns:a16="http://schemas.microsoft.com/office/drawing/2014/main" id="{20496670-6825-8514-F96D-F6756AA987C4}"/>
+              </a:ext>
+            </a:extLst>
+          </p:cNvPr>
+          <p:cNvSpPr txBox="1"/>
+          <p:nvPr/>
+        </p:nvSpPr>
+        <p:spPr>
+          <a:xfrm>
+            <a:off x="482833" y="5724558"/>
+            <a:ext cx="11379200" cy="369332"/>
+          </a:xfrm>
+          <a:prstGeom prst="rect">
+            <a:avLst/>
+          </a:prstGeom>
+          <a:noFill/>
+        </p:spPr>
+        <p:txBody>
+          <a:bodyPr wrap="square" rtlCol="0">
+            <a:spAutoFit/>
+          </a:bodyPr>
+          <a:lstStyle/>
+          <a:p>
+            <a:r>
+              <a:rPr lang="en-US" dirty="0"/>
+              <a:t>Slightly higher percentage of defaults in the "Other" home ownership category.</a:t>
+            </a:r>
+          </a:p>
+        </p:txBody>
+      </p:sp>
+      <p:pic>
+        <p:nvPicPr>
+          <p:cNvPr id="6" name="Picture 5">
+            <a:extLst>
+              <a:ext uri="{FF2B5EF4-FFF2-40B4-BE49-F238E27FC236}">
+                <a16:creationId xmlns:a16="http://schemas.microsoft.com/office/drawing/2014/main" id="{E573AC79-FD60-4482-F043-66ACB9AA19A8}"/>
+              </a:ext>
+            </a:extLst>
+          </p:cNvPr>
+          <p:cNvPicPr>
+            <a:picLocks noChangeAspect="1"/>
+          </p:cNvPicPr>
+          <p:nvPr/>
+        </p:nvPicPr>
+        <p:blipFill>
+          <a:blip r:embed="rId2"/>
+          <a:stretch>
+            <a:fillRect/>
+          </a:stretch>
+        </p:blipFill>
+        <p:spPr>
+          <a:xfrm>
+            <a:off x="1171852" y="681038"/>
+            <a:ext cx="9405105" cy="4850336"/>
+          </a:xfrm>
+          <a:prstGeom prst="rect">
+            <a:avLst/>
+          </a:prstGeom>
+        </p:spPr>
+      </p:pic>
     </p:spTree>
     <p:extLst>
       <p:ext uri="{BB962C8B-B14F-4D97-AF65-F5344CB8AC3E}">
-        <p14:creationId xmlns:p14="http://schemas.microsoft.com/office/powerpoint/2010/main" val="1415256672"/>
+        <p14:creationId xmlns:p14="http://schemas.microsoft.com/office/powerpoint/2010/main" val="398074364"/>
       </p:ext>
     </p:extLst>
   </p:cSld>
@@ -4450,7 +4349,7 @@
           <p:cNvPr id="2" name="Title 1">
             <a:extLst>
               <a:ext uri="{FF2B5EF4-FFF2-40B4-BE49-F238E27FC236}">
-                <a16:creationId xmlns:a16="http://schemas.microsoft.com/office/drawing/2014/main" id="{A55DB2F6-88AC-34B4-0212-56CEAF7419DF}"/>
+                <a16:creationId xmlns:a16="http://schemas.microsoft.com/office/drawing/2014/main" id="{FBAF1ACA-C322-D44E-F598-C73F1596AE95}"/>
               </a:ext>
             </a:extLst>
           </p:cNvPr>
@@ -4461,7 +4360,12 @@
             <p:ph type="title"/>
           </p:nvPr>
         </p:nvSpPr>
-        <p:spPr/>
+        <p:spPr>
+          <a:xfrm>
+            <a:off x="838200" y="-203052"/>
+            <a:ext cx="10515600" cy="1325563"/>
+          </a:xfrm>
+        </p:spPr>
         <p:txBody>
           <a:bodyPr>
             <a:normAutofit/>
@@ -4472,7 +4376,7 @@
               <a:rPr lang="en-US" sz="2800" b="1" dirty="0">
                 <a:latin typeface="+mn-lt"/>
               </a:rPr>
-              <a:t>Recommendations to Lending Club.</a:t>
+              <a:t>EDA Insights:</a:t>
             </a:r>
           </a:p>
         </p:txBody>
@@ -4482,7 +4386,7 @@
           <p:cNvPr id="3" name="Content Placeholder 2">
             <a:extLst>
               <a:ext uri="{FF2B5EF4-FFF2-40B4-BE49-F238E27FC236}">
-                <a16:creationId xmlns:a16="http://schemas.microsoft.com/office/drawing/2014/main" id="{9890CE3C-799F-590F-1CD1-77148C782BB7}"/>
+                <a16:creationId xmlns:a16="http://schemas.microsoft.com/office/drawing/2014/main" id="{3EFD0632-3C11-A6EA-0D98-398D85822143}"/>
               </a:ext>
             </a:extLst>
           </p:cNvPr>
@@ -4495,8 +4399,8 @@
         </p:nvSpPr>
         <p:spPr>
           <a:xfrm>
-            <a:off x="838200" y="1585919"/>
-            <a:ext cx="10515600" cy="4351338"/>
+            <a:off x="838200" y="857953"/>
+            <a:ext cx="10515600" cy="5667133"/>
           </a:xfrm>
         </p:spPr>
         <p:txBody>
@@ -4509,20 +4413,245 @@
               <a:buNone/>
             </a:pPr>
             <a:r>
-              <a:rPr lang="en-US" sz="1400" dirty="0"/>
+              <a:rPr lang="en-US" sz="1600" b="1" dirty="0"/>
+              <a:t>Interest Rates and Defaults:</a:t>
+            </a:r>
+            <a:endParaRPr lang="en-US" sz="1600" dirty="0"/>
+          </a:p>
+          <a:p>
+            <a:pPr>
+              <a:buFont typeface="Arial" panose="020B0604020202020204" pitchFamily="34" charset="0"/>
+              <a:buChar char="•"/>
+            </a:pPr>
+            <a:r>
+              <a:rPr lang="en-US" sz="1600" dirty="0"/>
+              <a:t>Higher interest rates are strongly linked to increased default rates, regardless of loan duration or verification status.</a:t>
+            </a:r>
+          </a:p>
+          <a:p>
+            <a:pPr>
+              <a:buFont typeface="Arial" panose="020B0604020202020204" pitchFamily="34" charset="0"/>
+              <a:buChar char="•"/>
+            </a:pPr>
+            <a:r>
+              <a:rPr lang="en-US" sz="1600" dirty="0"/>
+              <a:t>Borrowers with high revolving credit utilization face higher interest rates and tend to default more often.</a:t>
+            </a:r>
+          </a:p>
+          <a:p>
+            <a:pPr marL="0" indent="0">
+              <a:buNone/>
+            </a:pPr>
+            <a:r>
+              <a:rPr lang="en-US" sz="1600" b="1" dirty="0"/>
+              <a:t>Loan Amount and Defaults:</a:t>
+            </a:r>
+            <a:endParaRPr lang="en-US" sz="1600" dirty="0"/>
+          </a:p>
+          <a:p>
+            <a:pPr>
+              <a:buFont typeface="Arial" panose="020B0604020202020204" pitchFamily="34" charset="0"/>
+              <a:buChar char="•"/>
+            </a:pPr>
+            <a:r>
+              <a:rPr lang="en-US" sz="1600" dirty="0"/>
+              <a:t>Larger loan amounts, especially in small business and home loan categories, are associated with higher default rates.</a:t>
+            </a:r>
+          </a:p>
+          <a:p>
+            <a:pPr>
+              <a:buFont typeface="Arial" panose="020B0604020202020204" pitchFamily="34" charset="0"/>
+              <a:buChar char="•"/>
+            </a:pPr>
+            <a:r>
+              <a:rPr lang="en-US" sz="1600" dirty="0"/>
+              <a:t>High loan amounts in small business loans have a strong correlation with defaults.</a:t>
+            </a:r>
+          </a:p>
+          <a:p>
+            <a:pPr marL="0" indent="0">
+              <a:buNone/>
+            </a:pPr>
+            <a:r>
+              <a:rPr lang="en-US" sz="1600" b="1" dirty="0"/>
+              <a:t>Credit Grades and Defaults:</a:t>
+            </a:r>
+            <a:endParaRPr lang="en-US" sz="1600" dirty="0"/>
+          </a:p>
+          <a:p>
+            <a:pPr>
+              <a:buFont typeface="Arial" panose="020B0604020202020204" pitchFamily="34" charset="0"/>
+              <a:buChar char="•"/>
+            </a:pPr>
+            <a:r>
+              <a:rPr lang="en-US" sz="1600" dirty="0"/>
+              <a:t>Lower credit grades (F and G) are associated with higher default rates and larger loan amounts, with borrowers in these grades having more public derogatory records.</a:t>
+            </a:r>
+          </a:p>
+          <a:p>
+            <a:pPr>
+              <a:buFont typeface="Arial" panose="020B0604020202020204" pitchFamily="34" charset="0"/>
+              <a:buChar char="•"/>
+            </a:pPr>
+            <a:r>
+              <a:rPr lang="en-US" sz="1600" dirty="0"/>
+              <a:t>A-grade borrowers have fewer derogatory records and a lower default rate.</a:t>
+            </a:r>
+          </a:p>
+          <a:p>
+            <a:pPr marL="0" indent="0">
+              <a:buNone/>
+            </a:pPr>
+            <a:r>
+              <a:rPr lang="en-US" sz="1600" b="1" dirty="0"/>
+              <a:t>Home Ownership and DTI:</a:t>
+            </a:r>
+            <a:endParaRPr lang="en-US" sz="1600" dirty="0"/>
+          </a:p>
+          <a:p>
+            <a:pPr>
+              <a:buFont typeface="Arial" panose="020B0604020202020204" pitchFamily="34" charset="0"/>
+              <a:buChar char="•"/>
+            </a:pPr>
+            <a:r>
+              <a:rPr lang="en-US" sz="1600" dirty="0"/>
+              <a:t>Borrowers with mortgages have higher incomes but also larger loan amounts, which correlate with higher default rates.</a:t>
+            </a:r>
+          </a:p>
+          <a:p>
+            <a:pPr>
+              <a:buFont typeface="Arial" panose="020B0604020202020204" pitchFamily="34" charset="0"/>
+              <a:buChar char="•"/>
+            </a:pPr>
+            <a:r>
+              <a:rPr lang="en-US" sz="1600" dirty="0"/>
+              <a:t>Other home ownership categories have a lower DTI ratio but a similar likelihood of default compared to other categories.</a:t>
+            </a:r>
+          </a:p>
+        </p:txBody>
+      </p:sp>
+    </p:spTree>
+    <p:extLst>
+      <p:ext uri="{BB962C8B-B14F-4D97-AF65-F5344CB8AC3E}">
+        <p14:creationId xmlns:p14="http://schemas.microsoft.com/office/powerpoint/2010/main" val="1415256672"/>
+      </p:ext>
+    </p:extLst>
+  </p:cSld>
+  <p:clrMapOvr>
+    <a:masterClrMapping/>
+  </p:clrMapOvr>
+</p:sld>
+</file>
+
+<file path=ppt/slides/slide16.xml><?xml version="1.0" encoding="utf-8"?>
+<p:sld xmlns:a="http://schemas.openxmlformats.org/drawingml/2006/main" xmlns:r="http://schemas.openxmlformats.org/officeDocument/2006/relationships" xmlns:p="http://schemas.openxmlformats.org/presentationml/2006/main">
+  <p:cSld>
+    <p:spTree>
+      <p:nvGrpSpPr>
+        <p:cNvPr id="1" name=""/>
+        <p:cNvGrpSpPr/>
+        <p:nvPr/>
+      </p:nvGrpSpPr>
+      <p:grpSpPr>
+        <a:xfrm>
+          <a:off x="0" y="0"/>
+          <a:ext cx="0" cy="0"/>
+          <a:chOff x="0" y="0"/>
+          <a:chExt cx="0" cy="0"/>
+        </a:xfrm>
+      </p:grpSpPr>
+      <p:sp>
+        <p:nvSpPr>
+          <p:cNvPr id="2" name="Title 1">
+            <a:extLst>
+              <a:ext uri="{FF2B5EF4-FFF2-40B4-BE49-F238E27FC236}">
+                <a16:creationId xmlns:a16="http://schemas.microsoft.com/office/drawing/2014/main" id="{A55DB2F6-88AC-34B4-0212-56CEAF7419DF}"/>
+              </a:ext>
+            </a:extLst>
+          </p:cNvPr>
+          <p:cNvSpPr>
+            <a:spLocks noGrp="1"/>
+          </p:cNvSpPr>
+          <p:nvPr>
+            <p:ph type="title"/>
+          </p:nvPr>
+        </p:nvSpPr>
+        <p:spPr>
+          <a:xfrm>
+            <a:off x="838200" y="116548"/>
+            <a:ext cx="10515600" cy="1325563"/>
+          </a:xfrm>
+        </p:spPr>
+        <p:txBody>
+          <a:bodyPr>
+            <a:normAutofit/>
+          </a:bodyPr>
+          <a:lstStyle/>
+          <a:p>
+            <a:r>
+              <a:rPr lang="en-US" sz="2800" b="1" dirty="0">
+                <a:latin typeface="+mn-lt"/>
+              </a:rPr>
+              <a:t>Recommendations:</a:t>
+            </a:r>
+          </a:p>
+        </p:txBody>
+      </p:sp>
+      <p:sp>
+        <p:nvSpPr>
+          <p:cNvPr id="3" name="Content Placeholder 2">
+            <a:extLst>
+              <a:ext uri="{FF2B5EF4-FFF2-40B4-BE49-F238E27FC236}">
+                <a16:creationId xmlns:a16="http://schemas.microsoft.com/office/drawing/2014/main" id="{9890CE3C-799F-590F-1CD1-77148C782BB7}"/>
+              </a:ext>
+            </a:extLst>
+          </p:cNvPr>
+          <p:cNvSpPr>
+            <a:spLocks noGrp="1"/>
+          </p:cNvSpPr>
+          <p:nvPr>
+            <p:ph idx="1"/>
+          </p:nvPr>
+        </p:nvSpPr>
+        <p:spPr>
+          <a:xfrm>
+            <a:off x="838200" y="1355098"/>
+            <a:ext cx="10515600" cy="4351338"/>
+          </a:xfrm>
+        </p:spPr>
+        <p:txBody>
+          <a:bodyPr>
+            <a:noAutofit/>
+          </a:bodyPr>
+          <a:lstStyle/>
+          <a:p>
+            <a:pPr marL="0" indent="0">
+              <a:buNone/>
+            </a:pPr>
+            <a:r>
+              <a:rPr lang="en-US" sz="1600" b="1" dirty="0"/>
               <a:t>Refine Home Ownership Criteria:</a:t>
             </a:r>
-          </a:p>
-          <a:p>
-            <a:r>
-              <a:rPr lang="en-US" sz="1400" dirty="0"/>
-              <a:t>    Adjust lending criteria for different home ownership categories based on observed default rates and DTI ratios.</a:t>
-            </a:r>
-          </a:p>
-          <a:p>
-            <a:r>
-              <a:rPr lang="en-US" sz="1400" dirty="0"/>
-              <a:t>    Consider offering tailored financial products that align with the risk profile of borrowers in different home ownership categories.</a:t>
+            <a:endParaRPr lang="en-US" sz="1600" dirty="0"/>
+          </a:p>
+          <a:p>
+            <a:pPr>
+              <a:buFont typeface="Arial" panose="020B0604020202020204" pitchFamily="34" charset="0"/>
+              <a:buChar char="•"/>
+            </a:pPr>
+            <a:r>
+              <a:rPr lang="en-US" sz="1600" dirty="0"/>
+              <a:t>Modify lending criteria for various home ownership categories based on observed default rates and DTI ratios.</a:t>
+            </a:r>
+          </a:p>
+          <a:p>
+            <a:pPr>
+              <a:buFont typeface="Arial" panose="020B0604020202020204" pitchFamily="34" charset="0"/>
+              <a:buChar char="•"/>
+            </a:pPr>
+            <a:r>
+              <a:rPr lang="en-US" sz="1600" dirty="0"/>
+              <a:t>Consider creating customized financial products to match the risk profiles of borrowers in different home ownership categories.</a:t>
             </a:r>
           </a:p>
           <a:p>
@@ -4530,20 +4659,34 @@
               <a:buNone/>
             </a:pPr>
             <a:r>
-              <a:rPr lang="en-US" sz="1400" dirty="0"/>
+              <a:rPr lang="en-US" sz="1600" b="1" dirty="0"/>
               <a:t>Improve Verification Processes:</a:t>
             </a:r>
-          </a:p>
-          <a:p>
-            <a:r>
-              <a:rPr lang="en-US" sz="1400" dirty="0"/>
-              <a:t>    Increase focus on thorough verification processes to ensure that loans are given to verified borrowers, as they tend to have more reliable repayment behavior.</a:t>
-            </a:r>
-          </a:p>
-          <a:p>
-            <a:r>
-              <a:rPr lang="en-US" sz="1400" dirty="0"/>
-              <a:t>    Explore options for improving verification for categories with higher default rates, such as the "Not Verified" category.</a:t>
+            <a:endParaRPr lang="en-US" sz="1600" dirty="0"/>
+          </a:p>
+          <a:p>
+            <a:pPr>
+              <a:buFont typeface="Arial" panose="020B0604020202020204" pitchFamily="34" charset="0"/>
+              <a:buChar char="•"/>
+            </a:pPr>
+            <a:r>
+              <a:rPr lang="en-US" sz="1600" dirty="0"/>
+              <a:t>Enhance verification procedures to ensure loans are issued to </a:t>
+            </a:r>
+            <a:r>
+              <a:rPr lang="en-US" sz="1600"/>
+              <a:t>verified borrowers</a:t>
+            </a:r>
+            <a:endParaRPr lang="en-US" sz="1600" dirty="0"/>
+          </a:p>
+          <a:p>
+            <a:pPr>
+              <a:buFont typeface="Arial" panose="020B0604020202020204" pitchFamily="34" charset="0"/>
+              <a:buChar char="•"/>
+            </a:pPr>
+            <a:r>
+              <a:rPr lang="en-US" sz="1600" dirty="0"/>
+              <a:t>Explore ways to improve verification for categories with higher default rates, like the "Not Verified" group.</a:t>
             </a:r>
           </a:p>
           <a:p>
@@ -4551,14 +4694,19 @@
               <a:buNone/>
             </a:pPr>
             <a:r>
-              <a:rPr lang="en-US" sz="1400" dirty="0"/>
+              <a:rPr lang="en-US" sz="1600" b="1" dirty="0"/>
               <a:t>Monitor and Analyze Trends:</a:t>
             </a:r>
-          </a:p>
-          <a:p>
-            <a:r>
-              <a:rPr lang="en-US" sz="1400" dirty="0"/>
-              <a:t>    Continuously monitor default rates and interest rate impacts across different loan types, credit grades, and home ownership categories.</a:t>
+            <a:endParaRPr lang="en-US" sz="1600" dirty="0"/>
+          </a:p>
+          <a:p>
+            <a:pPr>
+              <a:buFont typeface="Arial" panose="020B0604020202020204" pitchFamily="34" charset="0"/>
+              <a:buChar char="•"/>
+            </a:pPr>
+            <a:r>
+              <a:rPr lang="en-US" sz="1600" dirty="0"/>
+              <a:t>Continuously track default rates and the effects of interest rates across different loan types, credit grades, and home ownership categories.</a:t>
             </a:r>
           </a:p>
         </p:txBody>

</xml_diff>